<commit_message>
More darpa logo removals.
</commit_message>
<xml_diff>
--- a/BICMEE2020_logo_registration_site.pptx
+++ b/BICMEE2020_logo_registration_site.pptx
@@ -104,6 +104,11 @@
       </a:defRPr>
     </a:lvl9pPr>
   </p:defaultTextStyle>
+  <p:extLst>
+    <p:ext uri="{EFAFB233-063F-42B5-8137-9DF3F51BA10A}">
+      <p15:sldGuideLst xmlns:p15="http://schemas.microsoft.com/office/powerpoint/2012/main"/>
+    </p:ext>
+  </p:extLst>
 </p:presentation>
 </file>
 
@@ -254,7 +259,7 @@
           <a:p>
             <a:fld id="{B4C0DAAE-9B19-9C46-ABF4-D353F620F52A}" type="datetimeFigureOut">
               <a:rPr lang="en-US" smtClean="0"/>
-              <a:t>1/20/20</a:t>
+              <a:t>2/27/20</a:t>
             </a:fld>
             <a:endParaRPr lang="en-US"/>
           </a:p>
@@ -452,7 +457,7 @@
           <a:p>
             <a:fld id="{B4C0DAAE-9B19-9C46-ABF4-D353F620F52A}" type="datetimeFigureOut">
               <a:rPr lang="en-US" smtClean="0"/>
-              <a:t>1/20/20</a:t>
+              <a:t>2/27/20</a:t>
             </a:fld>
             <a:endParaRPr lang="en-US"/>
           </a:p>
@@ -660,7 +665,7 @@
           <a:p>
             <a:fld id="{B4C0DAAE-9B19-9C46-ABF4-D353F620F52A}" type="datetimeFigureOut">
               <a:rPr lang="en-US" smtClean="0"/>
-              <a:t>1/20/20</a:t>
+              <a:t>2/27/20</a:t>
             </a:fld>
             <a:endParaRPr lang="en-US"/>
           </a:p>
@@ -858,7 +863,7 @@
           <a:p>
             <a:fld id="{B4C0DAAE-9B19-9C46-ABF4-D353F620F52A}" type="datetimeFigureOut">
               <a:rPr lang="en-US" smtClean="0"/>
-              <a:t>1/20/20</a:t>
+              <a:t>2/27/20</a:t>
             </a:fld>
             <a:endParaRPr lang="en-US"/>
           </a:p>
@@ -1133,7 +1138,7 @@
           <a:p>
             <a:fld id="{B4C0DAAE-9B19-9C46-ABF4-D353F620F52A}" type="datetimeFigureOut">
               <a:rPr lang="en-US" smtClean="0"/>
-              <a:t>1/20/20</a:t>
+              <a:t>2/27/20</a:t>
             </a:fld>
             <a:endParaRPr lang="en-US"/>
           </a:p>
@@ -1398,7 +1403,7 @@
           <a:p>
             <a:fld id="{B4C0DAAE-9B19-9C46-ABF4-D353F620F52A}" type="datetimeFigureOut">
               <a:rPr lang="en-US" smtClean="0"/>
-              <a:t>1/20/20</a:t>
+              <a:t>2/27/20</a:t>
             </a:fld>
             <a:endParaRPr lang="en-US"/>
           </a:p>
@@ -1810,7 +1815,7 @@
           <a:p>
             <a:fld id="{B4C0DAAE-9B19-9C46-ABF4-D353F620F52A}" type="datetimeFigureOut">
               <a:rPr lang="en-US" smtClean="0"/>
-              <a:t>1/20/20</a:t>
+              <a:t>2/27/20</a:t>
             </a:fld>
             <a:endParaRPr lang="en-US"/>
           </a:p>
@@ -1951,7 +1956,7 @@
           <a:p>
             <a:fld id="{B4C0DAAE-9B19-9C46-ABF4-D353F620F52A}" type="datetimeFigureOut">
               <a:rPr lang="en-US" smtClean="0"/>
-              <a:t>1/20/20</a:t>
+              <a:t>2/27/20</a:t>
             </a:fld>
             <a:endParaRPr lang="en-US"/>
           </a:p>
@@ -2064,7 +2069,7 @@
           <a:p>
             <a:fld id="{B4C0DAAE-9B19-9C46-ABF4-D353F620F52A}" type="datetimeFigureOut">
               <a:rPr lang="en-US" smtClean="0"/>
-              <a:t>1/20/20</a:t>
+              <a:t>2/27/20</a:t>
             </a:fld>
             <a:endParaRPr lang="en-US"/>
           </a:p>
@@ -2375,7 +2380,7 @@
           <a:p>
             <a:fld id="{B4C0DAAE-9B19-9C46-ABF4-D353F620F52A}" type="datetimeFigureOut">
               <a:rPr lang="en-US" smtClean="0"/>
-              <a:t>1/20/20</a:t>
+              <a:t>2/27/20</a:t>
             </a:fld>
             <a:endParaRPr lang="en-US"/>
           </a:p>
@@ -2663,7 +2668,7 @@
           <a:p>
             <a:fld id="{B4C0DAAE-9B19-9C46-ABF4-D353F620F52A}" type="datetimeFigureOut">
               <a:rPr lang="en-US" smtClean="0"/>
-              <a:t>1/20/20</a:t>
+              <a:t>2/27/20</a:t>
             </a:fld>
             <a:endParaRPr lang="en-US"/>
           </a:p>
@@ -2904,7 +2909,7 @@
           <a:p>
             <a:fld id="{B4C0DAAE-9B19-9C46-ABF4-D353F620F52A}" type="datetimeFigureOut">
               <a:rPr lang="en-US" smtClean="0"/>
-              <a:t>1/20/20</a:t>
+              <a:t>2/27/20</a:t>
             </a:fld>
             <a:endParaRPr lang="en-US"/>
           </a:p>
@@ -3405,36 +3410,6 @@
           </a:p>
         </p:txBody>
       </p:sp>
-      <p:pic>
-        <p:nvPicPr>
-          <p:cNvPr id="10" name="Picture 9" descr="A picture containing blue, food, sitting, parked&#10;&#10;Description automatically generated">
-            <a:extLst>
-              <a:ext uri="{FF2B5EF4-FFF2-40B4-BE49-F238E27FC236}">
-                <a16:creationId xmlns:a16="http://schemas.microsoft.com/office/drawing/2014/main" id="{A4DA9958-753E-0A47-8277-607D152C5570}"/>
-              </a:ext>
-            </a:extLst>
-          </p:cNvPr>
-          <p:cNvPicPr>
-            <a:picLocks noChangeAspect="1"/>
-          </p:cNvPicPr>
-          <p:nvPr/>
-        </p:nvPicPr>
-        <p:blipFill>
-          <a:blip r:embed="rId3"/>
-          <a:stretch>
-            <a:fillRect/>
-          </a:stretch>
-        </p:blipFill>
-        <p:spPr>
-          <a:xfrm>
-            <a:off x="9109666" y="2918452"/>
-            <a:ext cx="1631256" cy="836696"/>
-          </a:xfrm>
-          <a:prstGeom prst="rect">
-            <a:avLst/>
-          </a:prstGeom>
-        </p:spPr>
-      </p:pic>
     </p:spTree>
     <p:extLst>
       <p:ext uri="{BB962C8B-B14F-4D97-AF65-F5344CB8AC3E}">

</xml_diff>